<commit_message>
schematic_fig_d23a.pptx: use revised o1, o2, and o3.png; export to .pdf, then to .png (via Preview).
</commit_message>
<xml_diff>
--- a/schematic_fig_d23a.pptx
+++ b/schematic_fig_d23a.pptx
@@ -243,7 +243,7 @@
           <a:p>
             <a:fld id="{4F521F6D-58AB-1343-8C50-4E6DEFB1C668}" type="datetimeFigureOut">
               <a:rPr lang="en-US" smtClean="0"/>
-              <a:t>10/23/23</a:t>
+              <a:t>1/16/24</a:t>
             </a:fld>
             <a:endParaRPr lang="en-US"/>
           </a:p>
@@ -413,7 +413,7 @@
           <a:p>
             <a:fld id="{4F521F6D-58AB-1343-8C50-4E6DEFB1C668}" type="datetimeFigureOut">
               <a:rPr lang="en-US" smtClean="0"/>
-              <a:t>10/23/23</a:t>
+              <a:t>1/16/24</a:t>
             </a:fld>
             <a:endParaRPr lang="en-US"/>
           </a:p>
@@ -593,7 +593,7 @@
           <a:p>
             <a:fld id="{4F521F6D-58AB-1343-8C50-4E6DEFB1C668}" type="datetimeFigureOut">
               <a:rPr lang="en-US" smtClean="0"/>
-              <a:t>10/23/23</a:t>
+              <a:t>1/16/24</a:t>
             </a:fld>
             <a:endParaRPr lang="en-US"/>
           </a:p>
@@ -763,7 +763,7 @@
           <a:p>
             <a:fld id="{4F521F6D-58AB-1343-8C50-4E6DEFB1C668}" type="datetimeFigureOut">
               <a:rPr lang="en-US" smtClean="0"/>
-              <a:t>10/23/23</a:t>
+              <a:t>1/16/24</a:t>
             </a:fld>
             <a:endParaRPr lang="en-US"/>
           </a:p>
@@ -1007,7 +1007,7 @@
           <a:p>
             <a:fld id="{4F521F6D-58AB-1343-8C50-4E6DEFB1C668}" type="datetimeFigureOut">
               <a:rPr lang="en-US" smtClean="0"/>
-              <a:t>10/23/23</a:t>
+              <a:t>1/16/24</a:t>
             </a:fld>
             <a:endParaRPr lang="en-US"/>
           </a:p>
@@ -1239,7 +1239,7 @@
           <a:p>
             <a:fld id="{4F521F6D-58AB-1343-8C50-4E6DEFB1C668}" type="datetimeFigureOut">
               <a:rPr lang="en-US" smtClean="0"/>
-              <a:t>10/23/23</a:t>
+              <a:t>1/16/24</a:t>
             </a:fld>
             <a:endParaRPr lang="en-US"/>
           </a:p>
@@ -1606,7 +1606,7 @@
           <a:p>
             <a:fld id="{4F521F6D-58AB-1343-8C50-4E6DEFB1C668}" type="datetimeFigureOut">
               <a:rPr lang="en-US" smtClean="0"/>
-              <a:t>10/23/23</a:t>
+              <a:t>1/16/24</a:t>
             </a:fld>
             <a:endParaRPr lang="en-US"/>
           </a:p>
@@ -1724,7 +1724,7 @@
           <a:p>
             <a:fld id="{4F521F6D-58AB-1343-8C50-4E6DEFB1C668}" type="datetimeFigureOut">
               <a:rPr lang="en-US" smtClean="0"/>
-              <a:t>10/23/23</a:t>
+              <a:t>1/16/24</a:t>
             </a:fld>
             <a:endParaRPr lang="en-US"/>
           </a:p>
@@ -1819,7 +1819,7 @@
           <a:p>
             <a:fld id="{4F521F6D-58AB-1343-8C50-4E6DEFB1C668}" type="datetimeFigureOut">
               <a:rPr lang="en-US" smtClean="0"/>
-              <a:t>10/23/23</a:t>
+              <a:t>1/16/24</a:t>
             </a:fld>
             <a:endParaRPr lang="en-US"/>
           </a:p>
@@ -2096,7 +2096,7 @@
           <a:p>
             <a:fld id="{4F521F6D-58AB-1343-8C50-4E6DEFB1C668}" type="datetimeFigureOut">
               <a:rPr lang="en-US" smtClean="0"/>
-              <a:t>10/23/23</a:t>
+              <a:t>1/16/24</a:t>
             </a:fld>
             <a:endParaRPr lang="en-US"/>
           </a:p>
@@ -2353,7 +2353,7 @@
           <a:p>
             <a:fld id="{4F521F6D-58AB-1343-8C50-4E6DEFB1C668}" type="datetimeFigureOut">
               <a:rPr lang="en-US" smtClean="0"/>
-              <a:t>10/23/23</a:t>
+              <a:t>1/16/24</a:t>
             </a:fld>
             <a:endParaRPr lang="en-US"/>
           </a:p>
@@ -2566,7 +2566,7 @@
           <a:p>
             <a:fld id="{4F521F6D-58AB-1343-8C50-4E6DEFB1C668}" type="datetimeFigureOut">
               <a:rPr lang="en-US" smtClean="0"/>
-              <a:t>10/23/23</a:t>
+              <a:t>1/16/24</a:t>
             </a:fld>
             <a:endParaRPr lang="en-US"/>
           </a:p>
@@ -2993,7 +2993,7 @@
         <p:spPr>
           <a:xfrm>
             <a:off x="6003030" y="6958793"/>
-            <a:ext cx="2547038" cy="2037631"/>
+            <a:ext cx="2547038" cy="2037630"/>
           </a:xfrm>
           <a:prstGeom prst="rect">
             <a:avLst/>
@@ -3022,7 +3022,7 @@
         <p:spPr>
           <a:xfrm>
             <a:off x="6003030" y="3938112"/>
-            <a:ext cx="2547038" cy="2037631"/>
+            <a:ext cx="2547038" cy="2037630"/>
           </a:xfrm>
           <a:prstGeom prst="rect">
             <a:avLst/>
@@ -3031,7 +3031,7 @@
       </p:pic>
       <p:pic>
         <p:nvPicPr>
-          <p:cNvPr id="137" name="Picture 136" descr="A diagram of a sea level&#10;&#10;Description automatically generated">
+          <p:cNvPr id="137" name="Picture 136">
             <a:extLst>
               <a:ext uri="{FF2B5EF4-FFF2-40B4-BE49-F238E27FC236}">
                 <a16:creationId xmlns:a16="http://schemas.microsoft.com/office/drawing/2014/main" id="{F065D71E-1F78-3F74-F6BB-2B0D5ACF936F}"/>
@@ -3045,14 +3045,13 @@
         </p:nvPicPr>
         <p:blipFill>
           <a:blip r:embed="rId4"/>
-          <a:stretch>
-            <a:fillRect/>
-          </a:stretch>
+          <a:srcRect/>
+          <a:stretch/>
         </p:blipFill>
         <p:spPr>
           <a:xfrm>
             <a:off x="6006627" y="955183"/>
-            <a:ext cx="2547039" cy="2037631"/>
+            <a:ext cx="2547038" cy="2037631"/>
           </a:xfrm>
           <a:prstGeom prst="rect">
             <a:avLst/>

</xml_diff>

<commit_message>
schematic_fig_d23a.pptx: use revised plots of quantile functions and p-box; other minor edits.
</commit_message>
<xml_diff>
--- a/schematic_fig_d23a.pptx
+++ b/schematic_fig_d23a.pptx
@@ -243,7 +243,7 @@
           <a:p>
             <a:fld id="{4F521F6D-58AB-1343-8C50-4E6DEFB1C668}" type="datetimeFigureOut">
               <a:rPr lang="en-US" smtClean="0"/>
-              <a:t>1/16/24</a:t>
+              <a:t>7/17/24</a:t>
             </a:fld>
             <a:endParaRPr lang="en-US"/>
           </a:p>
@@ -413,7 +413,7 @@
           <a:p>
             <a:fld id="{4F521F6D-58AB-1343-8C50-4E6DEFB1C668}" type="datetimeFigureOut">
               <a:rPr lang="en-US" smtClean="0"/>
-              <a:t>1/16/24</a:t>
+              <a:t>7/17/24</a:t>
             </a:fld>
             <a:endParaRPr lang="en-US"/>
           </a:p>
@@ -593,7 +593,7 @@
           <a:p>
             <a:fld id="{4F521F6D-58AB-1343-8C50-4E6DEFB1C668}" type="datetimeFigureOut">
               <a:rPr lang="en-US" smtClean="0"/>
-              <a:t>1/16/24</a:t>
+              <a:t>7/17/24</a:t>
             </a:fld>
             <a:endParaRPr lang="en-US"/>
           </a:p>
@@ -763,7 +763,7 @@
           <a:p>
             <a:fld id="{4F521F6D-58AB-1343-8C50-4E6DEFB1C668}" type="datetimeFigureOut">
               <a:rPr lang="en-US" smtClean="0"/>
-              <a:t>1/16/24</a:t>
+              <a:t>7/17/24</a:t>
             </a:fld>
             <a:endParaRPr lang="en-US"/>
           </a:p>
@@ -1007,7 +1007,7 @@
           <a:p>
             <a:fld id="{4F521F6D-58AB-1343-8C50-4E6DEFB1C668}" type="datetimeFigureOut">
               <a:rPr lang="en-US" smtClean="0"/>
-              <a:t>1/16/24</a:t>
+              <a:t>7/17/24</a:t>
             </a:fld>
             <a:endParaRPr lang="en-US"/>
           </a:p>
@@ -1239,7 +1239,7 @@
           <a:p>
             <a:fld id="{4F521F6D-58AB-1343-8C50-4E6DEFB1C668}" type="datetimeFigureOut">
               <a:rPr lang="en-US" smtClean="0"/>
-              <a:t>1/16/24</a:t>
+              <a:t>7/17/24</a:t>
             </a:fld>
             <a:endParaRPr lang="en-US"/>
           </a:p>
@@ -1606,7 +1606,7 @@
           <a:p>
             <a:fld id="{4F521F6D-58AB-1343-8C50-4E6DEFB1C668}" type="datetimeFigureOut">
               <a:rPr lang="en-US" smtClean="0"/>
-              <a:t>1/16/24</a:t>
+              <a:t>7/17/24</a:t>
             </a:fld>
             <a:endParaRPr lang="en-US"/>
           </a:p>
@@ -1724,7 +1724,7 @@
           <a:p>
             <a:fld id="{4F521F6D-58AB-1343-8C50-4E6DEFB1C668}" type="datetimeFigureOut">
               <a:rPr lang="en-US" smtClean="0"/>
-              <a:t>1/16/24</a:t>
+              <a:t>7/17/24</a:t>
             </a:fld>
             <a:endParaRPr lang="en-US"/>
           </a:p>
@@ -1819,7 +1819,7 @@
           <a:p>
             <a:fld id="{4F521F6D-58AB-1343-8C50-4E6DEFB1C668}" type="datetimeFigureOut">
               <a:rPr lang="en-US" smtClean="0"/>
-              <a:t>1/16/24</a:t>
+              <a:t>7/17/24</a:t>
             </a:fld>
             <a:endParaRPr lang="en-US"/>
           </a:p>
@@ -2096,7 +2096,7 @@
           <a:p>
             <a:fld id="{4F521F6D-58AB-1343-8C50-4E6DEFB1C668}" type="datetimeFigureOut">
               <a:rPr lang="en-US" smtClean="0"/>
-              <a:t>1/16/24</a:t>
+              <a:t>7/17/24</a:t>
             </a:fld>
             <a:endParaRPr lang="en-US"/>
           </a:p>
@@ -2353,7 +2353,7 @@
           <a:p>
             <a:fld id="{4F521F6D-58AB-1343-8C50-4E6DEFB1C668}" type="datetimeFigureOut">
               <a:rPr lang="en-US" smtClean="0"/>
-              <a:t>1/16/24</a:t>
+              <a:t>7/17/24</a:t>
             </a:fld>
             <a:endParaRPr lang="en-US"/>
           </a:p>
@@ -2566,7 +2566,7 @@
           <a:p>
             <a:fld id="{4F521F6D-58AB-1343-8C50-4E6DEFB1C668}" type="datetimeFigureOut">
               <a:rPr lang="en-US" smtClean="0"/>
-              <a:t>1/16/24</a:t>
+              <a:t>7/17/24</a:t>
             </a:fld>
             <a:endParaRPr lang="en-US"/>
           </a:p>
@@ -2992,8 +2992,8 @@
         </p:blipFill>
         <p:spPr>
           <a:xfrm>
-            <a:off x="6003030" y="6958793"/>
-            <a:ext cx="2547038" cy="2037630"/>
+            <a:off x="6262997" y="6973082"/>
+            <a:ext cx="2037630" cy="2037630"/>
           </a:xfrm>
           <a:prstGeom prst="rect">
             <a:avLst/>
@@ -3021,8 +3021,8 @@
         </p:blipFill>
         <p:spPr>
           <a:xfrm>
-            <a:off x="6003030" y="3938112"/>
-            <a:ext cx="2547038" cy="2037630"/>
+            <a:off x="6266515" y="3941670"/>
+            <a:ext cx="2037630" cy="2037630"/>
           </a:xfrm>
           <a:prstGeom prst="rect">
             <a:avLst/>
@@ -3050,8 +3050,8 @@
         </p:blipFill>
         <p:spPr>
           <a:xfrm>
-            <a:off x="6006627" y="955183"/>
-            <a:ext cx="2547038" cy="2037631"/>
+            <a:off x="6266514" y="955183"/>
+            <a:ext cx="2037631" cy="2037631"/>
           </a:xfrm>
           <a:prstGeom prst="rect">
             <a:avLst/>
@@ -3152,7 +3152,7 @@
         </p:nvSpPr>
         <p:spPr>
           <a:xfrm>
-            <a:off x="5917118" y="25943"/>
+            <a:off x="6074286" y="25943"/>
             <a:ext cx="5570757" cy="646331"/>
           </a:xfrm>
           <a:prstGeom prst="rect">
@@ -3194,7 +3194,7 @@
         </p:nvSpPr>
         <p:spPr>
           <a:xfrm>
-            <a:off x="8515681" y="1175012"/>
+            <a:off x="8387089" y="1175012"/>
             <a:ext cx="2979389" cy="1446550"/>
           </a:xfrm>
           <a:prstGeom prst="rect">
@@ -3256,7 +3256,7 @@
         </p:nvSpPr>
         <p:spPr>
           <a:xfrm>
-            <a:off x="8515680" y="4539088"/>
+            <a:off x="8387088" y="4539088"/>
             <a:ext cx="2979389" cy="769441"/>
           </a:xfrm>
           <a:prstGeom prst="rect">
@@ -3299,7 +3299,7 @@
                 <a:latin typeface="Arial" panose="020B0604020202020204" pitchFamily="34" charset="0"/>
                 <a:cs typeface="Arial" panose="020B0604020202020204" pitchFamily="34" charset="0"/>
               </a:rPr>
-              <a:t> quantifies workflow ambiguity</a:t>
+              <a:t> quantifies method ambiguity</a:t>
             </a:r>
           </a:p>
         </p:txBody>
@@ -3318,7 +3318,7 @@
         </p:nvSpPr>
         <p:spPr>
           <a:xfrm>
-            <a:off x="8521187" y="7411084"/>
+            <a:off x="8392595" y="7411084"/>
             <a:ext cx="2979388" cy="1107996"/>
           </a:xfrm>
           <a:prstGeom prst="rect">
@@ -3380,7 +3380,7 @@
         </p:nvSpPr>
         <p:spPr>
           <a:xfrm>
-            <a:off x="2773639" y="1413655"/>
+            <a:off x="2849536" y="1426182"/>
             <a:ext cx="2523448" cy="923330"/>
           </a:xfrm>
           <a:prstGeom prst="rect">
@@ -3453,7 +3453,7 @@
         </p:nvSpPr>
         <p:spPr>
           <a:xfrm>
-            <a:off x="2397735" y="4462144"/>
+            <a:off x="2473632" y="4462143"/>
             <a:ext cx="3275256" cy="923330"/>
           </a:xfrm>
           <a:prstGeom prst="rect">
@@ -3526,7 +3526,7 @@
         </p:nvSpPr>
         <p:spPr>
           <a:xfrm>
-            <a:off x="2130034" y="7503417"/>
+            <a:off x="2200296" y="7498104"/>
             <a:ext cx="3810659" cy="923330"/>
           </a:xfrm>
           <a:prstGeom prst="rect">
@@ -3674,7 +3674,7 @@
         <p:spPr>
           <a:xfrm flipV="1">
             <a:off x="2254931" y="1887847"/>
-            <a:ext cx="3560864" cy="1"/>
+            <a:ext cx="3886669" cy="1"/>
           </a:xfrm>
           <a:prstGeom prst="straightConnector1">
             <a:avLst/>
@@ -3713,9 +3713,9 @@
           <p:nvPr/>
         </p:nvCxnSpPr>
         <p:spPr>
-          <a:xfrm flipV="1">
-            <a:off x="2254931" y="4938097"/>
-            <a:ext cx="3560864" cy="1"/>
+          <a:xfrm>
+            <a:off x="2254931" y="4938098"/>
+            <a:ext cx="3890187" cy="0"/>
           </a:xfrm>
           <a:prstGeom prst="straightConnector1">
             <a:avLst/>
@@ -3754,9 +3754,9 @@
           <p:nvPr/>
         </p:nvCxnSpPr>
         <p:spPr>
-          <a:xfrm flipV="1">
-            <a:off x="2254931" y="7977609"/>
-            <a:ext cx="3560864" cy="1"/>
+          <a:xfrm>
+            <a:off x="2254931" y="7977610"/>
+            <a:ext cx="3892173" cy="0"/>
           </a:xfrm>
           <a:prstGeom prst="straightConnector1">
             <a:avLst/>
@@ -3798,7 +3798,7 @@
         </p:nvCxnSpPr>
         <p:spPr>
           <a:xfrm>
-            <a:off x="8750004" y="2904471"/>
+            <a:off x="8875436" y="2904471"/>
             <a:ext cx="3597" cy="1044694"/>
           </a:xfrm>
           <a:prstGeom prst="straightConnector1">
@@ -3845,9 +3845,9 @@
           <p:nvPr/>
         </p:nvCxnSpPr>
         <p:spPr>
-          <a:xfrm>
-            <a:off x="8753601" y="5898453"/>
-            <a:ext cx="4411" cy="1077585"/>
+          <a:xfrm flipH="1">
+            <a:off x="8875435" y="5898453"/>
+            <a:ext cx="3598" cy="1077585"/>
           </a:xfrm>
           <a:prstGeom prst="straightConnector1">
             <a:avLst/>
@@ -3890,8 +3890,8 @@
         </p:nvSpPr>
         <p:spPr>
           <a:xfrm>
-            <a:off x="6012133" y="955183"/>
-            <a:ext cx="5475742" cy="1949288"/>
+            <a:off x="6262997" y="955183"/>
+            <a:ext cx="5224878" cy="1949288"/>
           </a:xfrm>
           <a:prstGeom prst="roundRect">
             <a:avLst/>
@@ -3942,8 +3942,8 @@
         </p:nvSpPr>
         <p:spPr>
           <a:xfrm>
-            <a:off x="6012132" y="3949165"/>
-            <a:ext cx="5482938" cy="1949288"/>
+            <a:off x="6262996" y="3949165"/>
+            <a:ext cx="5232073" cy="1949288"/>
           </a:xfrm>
           <a:prstGeom prst="roundRect">
             <a:avLst/>
@@ -3994,8 +3994,8 @@
         </p:nvSpPr>
         <p:spPr>
           <a:xfrm>
-            <a:off x="6028149" y="6976038"/>
-            <a:ext cx="5459726" cy="1949288"/>
+            <a:off x="6262995" y="6976038"/>
+            <a:ext cx="5224879" cy="1949288"/>
           </a:xfrm>
           <a:prstGeom prst="roundRect">
             <a:avLst/>
@@ -4034,17 +4034,15 @@
       </p:sp>
       <p:cxnSp>
         <p:nvCxnSpPr>
-          <p:cNvPr id="116" name="Curved Connector 115">
+          <p:cNvPr id="71" name="Curved Connector 70">
             <a:extLst>
               <a:ext uri="{FF2B5EF4-FFF2-40B4-BE49-F238E27FC236}">
-                <a16:creationId xmlns:a16="http://schemas.microsoft.com/office/drawing/2014/main" id="{6180C2EB-DB97-64C1-62D0-B480A25A2B82}"/>
+                <a16:creationId xmlns:a16="http://schemas.microsoft.com/office/drawing/2014/main" id="{5A70CD23-4DA5-F589-3B60-F1ED5FCE9BB4}"/>
               </a:ext>
             </a:extLst>
           </p:cNvPr>
           <p:cNvCxnSpPr>
             <a:cxnSpLocks/>
-            <a:stCxn id="106" idx="3"/>
-            <a:endCxn id="108" idx="3"/>
           </p:cNvCxnSpPr>
           <p:nvPr/>
         </p:nvCxnSpPr>

</xml_diff>